<commit_message>
overview added to powerpoint
</commit_message>
<xml_diff>
--- a/Presentation.pptx
+++ b/Presentation.pptx
@@ -274,7 +274,7 @@
           <a:p>
             <a:fld id="{CA74A7C5-AA60-9541-96F3-B9CBE66FF99F}" type="datetimeFigureOut">
               <a:rPr lang="en-US" smtClean="0"/>
-              <a:t>2/16/24</a:t>
+              <a:t>2/16/2024</a:t>
             </a:fld>
             <a:endParaRPr lang="en-US"/>
           </a:p>
@@ -474,7 +474,7 @@
           <a:p>
             <a:fld id="{CA74A7C5-AA60-9541-96F3-B9CBE66FF99F}" type="datetimeFigureOut">
               <a:rPr lang="en-US" smtClean="0"/>
-              <a:t>2/16/24</a:t>
+              <a:t>2/16/2024</a:t>
             </a:fld>
             <a:endParaRPr lang="en-US"/>
           </a:p>
@@ -684,7 +684,7 @@
           <a:p>
             <a:fld id="{CA74A7C5-AA60-9541-96F3-B9CBE66FF99F}" type="datetimeFigureOut">
               <a:rPr lang="en-US" smtClean="0"/>
-              <a:t>2/16/24</a:t>
+              <a:t>2/16/2024</a:t>
             </a:fld>
             <a:endParaRPr lang="en-US"/>
           </a:p>
@@ -884,7 +884,7 @@
           <a:p>
             <a:fld id="{CA74A7C5-AA60-9541-96F3-B9CBE66FF99F}" type="datetimeFigureOut">
               <a:rPr lang="en-US" smtClean="0"/>
-              <a:t>2/16/24</a:t>
+              <a:t>2/16/2024</a:t>
             </a:fld>
             <a:endParaRPr lang="en-US"/>
           </a:p>
@@ -1160,7 +1160,7 @@
           <a:p>
             <a:fld id="{CA74A7C5-AA60-9541-96F3-B9CBE66FF99F}" type="datetimeFigureOut">
               <a:rPr lang="en-US" smtClean="0"/>
-              <a:t>2/16/24</a:t>
+              <a:t>2/16/2024</a:t>
             </a:fld>
             <a:endParaRPr lang="en-US"/>
           </a:p>
@@ -1428,7 +1428,7 @@
           <a:p>
             <a:fld id="{CA74A7C5-AA60-9541-96F3-B9CBE66FF99F}" type="datetimeFigureOut">
               <a:rPr lang="en-US" smtClean="0"/>
-              <a:t>2/16/24</a:t>
+              <a:t>2/16/2024</a:t>
             </a:fld>
             <a:endParaRPr lang="en-US"/>
           </a:p>
@@ -1843,7 +1843,7 @@
           <a:p>
             <a:fld id="{CA74A7C5-AA60-9541-96F3-B9CBE66FF99F}" type="datetimeFigureOut">
               <a:rPr lang="en-US" smtClean="0"/>
-              <a:t>2/16/24</a:t>
+              <a:t>2/16/2024</a:t>
             </a:fld>
             <a:endParaRPr lang="en-US"/>
           </a:p>
@@ -1985,7 +1985,7 @@
           <a:p>
             <a:fld id="{CA74A7C5-AA60-9541-96F3-B9CBE66FF99F}" type="datetimeFigureOut">
               <a:rPr lang="en-US" smtClean="0"/>
-              <a:t>2/16/24</a:t>
+              <a:t>2/16/2024</a:t>
             </a:fld>
             <a:endParaRPr lang="en-US"/>
           </a:p>
@@ -2098,7 +2098,7 @@
           <a:p>
             <a:fld id="{CA74A7C5-AA60-9541-96F3-B9CBE66FF99F}" type="datetimeFigureOut">
               <a:rPr lang="en-US" smtClean="0"/>
-              <a:t>2/16/24</a:t>
+              <a:t>2/16/2024</a:t>
             </a:fld>
             <a:endParaRPr lang="en-US"/>
           </a:p>
@@ -2411,7 +2411,7 @@
           <a:p>
             <a:fld id="{CA74A7C5-AA60-9541-96F3-B9CBE66FF99F}" type="datetimeFigureOut">
               <a:rPr lang="en-US" smtClean="0"/>
-              <a:t>2/16/24</a:t>
+              <a:t>2/16/2024</a:t>
             </a:fld>
             <a:endParaRPr lang="en-US"/>
           </a:p>
@@ -2700,7 +2700,7 @@
           <a:p>
             <a:fld id="{CA74A7C5-AA60-9541-96F3-B9CBE66FF99F}" type="datetimeFigureOut">
               <a:rPr lang="en-US" smtClean="0"/>
-              <a:t>2/16/24</a:t>
+              <a:t>2/16/2024</a:t>
             </a:fld>
             <a:endParaRPr lang="en-US"/>
           </a:p>
@@ -2943,7 +2943,7 @@
           <a:p>
             <a:fld id="{CA74A7C5-AA60-9541-96F3-B9CBE66FF99F}" type="datetimeFigureOut">
               <a:rPr lang="en-US" smtClean="0"/>
-              <a:t>2/16/24</a:t>
+              <a:t>2/16/2024</a:t>
             </a:fld>
             <a:endParaRPr lang="en-US"/>
           </a:p>
@@ -3969,13 +3969,76 @@
         </p:nvSpPr>
         <p:spPr/>
         <p:txBody>
-          <a:bodyPr/>
-          <a:lstStyle/>
-          <a:p>
-            <a:endParaRPr lang="en-US"/>
-          </a:p>
-        </p:txBody>
-      </p:sp>
+          <a:bodyPr>
+            <a:normAutofit/>
+          </a:bodyPr>
+          <a:lstStyle/>
+          <a:p>
+            <a:r>
+              <a:rPr lang="en-GB" kern="150" dirty="0">
+                <a:effectLst/>
+                <a:latin typeface="Calibri" panose="020F0502020204030204" pitchFamily="34" charset="0"/>
+                <a:ea typeface="Calibri" panose="020F0502020204030204" pitchFamily="34" charset="0"/>
+                <a:cs typeface="Times New Roman" panose="02020603050405020304" pitchFamily="18" charset="0"/>
+              </a:rPr>
+              <a:t>Users can write reviews for music i.e. albums, singles, eps and gigs. The user can choose to review music that is already in the website’s database or add new music to the database.</a:t>
+            </a:r>
+          </a:p>
+          <a:p>
+            <a:pPr marL="0" indent="0">
+              <a:buNone/>
+            </a:pPr>
+            <a:endParaRPr lang="en-US" sz="4000" dirty="0"/>
+          </a:p>
+        </p:txBody>
+      </p:sp>
+      <p:pic>
+        <p:nvPicPr>
+          <p:cNvPr id="1026" name="Picture 2" descr="600+ Free Vinyl Record &amp; Vinyl Images - Pixabay">
+            <a:extLst>
+              <a:ext uri="{FF2B5EF4-FFF2-40B4-BE49-F238E27FC236}">
+                <a16:creationId xmlns:a16="http://schemas.microsoft.com/office/drawing/2014/main" id="{49207CD3-0461-89C8-D836-1AC2F846FCF0}"/>
+              </a:ext>
+            </a:extLst>
+          </p:cNvPr>
+          <p:cNvPicPr>
+            <a:picLocks noChangeAspect="1" noChangeArrowheads="1"/>
+          </p:cNvPicPr>
+          <p:nvPr/>
+        </p:nvPicPr>
+        <p:blipFill>
+          <a:blip r:embed="rId2">
+            <a:extLst>
+              <a:ext uri="{28A0092B-C50C-407E-A947-70E740481C1C}">
+                <a14:useLocalDpi xmlns:a14="http://schemas.microsoft.com/office/drawing/2010/main" val="0"/>
+              </a:ext>
+            </a:extLst>
+          </a:blip>
+          <a:srcRect/>
+          <a:stretch>
+            <a:fillRect/>
+          </a:stretch>
+        </p:blipFill>
+        <p:spPr bwMode="auto">
+          <a:xfrm>
+            <a:off x="8322593" y="3190461"/>
+            <a:ext cx="4220590" cy="4042534"/>
+          </a:xfrm>
+          <a:prstGeom prst="rect">
+            <a:avLst/>
+          </a:prstGeom>
+          <a:noFill/>
+          <a:extLst>
+            <a:ext uri="{909E8E84-426E-40DD-AFC4-6F175D3DCCD1}">
+              <a14:hiddenFill xmlns:a14="http://schemas.microsoft.com/office/drawing/2010/main">
+                <a:solidFill>
+                  <a:srgbClr val="FFFFFF"/>
+                </a:solidFill>
+              </a14:hiddenFill>
+            </a:ext>
+          </a:extLst>
+        </p:spPr>
+      </p:pic>
     </p:spTree>
     <p:extLst>
       <p:ext uri="{BB962C8B-B14F-4D97-AF65-F5344CB8AC3E}">

</xml_diff>